<commit_message>
add dfa sample picture to slides
</commit_message>
<xml_diff>
--- a/Proposal/Proposal - Slides.pptx
+++ b/Proposal/Proposal - Slides.pptx
@@ -112,6 +112,11 @@
       </a:defRPr>
     </a:lvl9pPr>
   </p:defaultTextStyle>
+  <p:extLst>
+    <p:ext uri="{EFAFB233-063F-42B5-8137-9DF3F51BA10A}">
+      <p15:sldGuideLst xmlns:p15="http://schemas.microsoft.com/office/powerpoint/2012/main"/>
+    </p:ext>
+  </p:extLst>
 </p:presentation>
 </file>
 
@@ -285,7 +290,7 @@
             <a:fld id="{87DE6118-2437-4B30-8E3C-4D2BE6020583}" type="datetimeFigureOut">
               <a:rPr lang="en-US" dirty="0"/>
               <a:pPr/>
-              <a:t>18/02/05</a:t>
+              <a:t>18/02/07</a:t>
             </a:fld>
             <a:endParaRPr lang="en-US" dirty="0"/>
           </a:p>
@@ -611,7 +616,7 @@
           <a:p>
             <a:fld id="{87DE6118-2437-4B30-8E3C-4D2BE6020583}" type="datetimeFigureOut">
               <a:rPr lang="en-US" dirty="0"/>
-              <a:t>18/02/05</a:t>
+              <a:t>18/02/07</a:t>
             </a:fld>
             <a:endParaRPr lang="en-US" dirty="0"/>
           </a:p>
@@ -786,7 +791,7 @@
           <a:p>
             <a:fld id="{87DE6118-2437-4B30-8E3C-4D2BE6020583}" type="datetimeFigureOut">
               <a:rPr lang="en-US" dirty="0"/>
-              <a:t>18/02/05</a:t>
+              <a:t>18/02/07</a:t>
             </a:fld>
             <a:endParaRPr lang="en-US" dirty="0"/>
           </a:p>
@@ -951,7 +956,7 @@
           <a:p>
             <a:fld id="{87DE6118-2437-4B30-8E3C-4D2BE6020583}" type="datetimeFigureOut">
               <a:rPr lang="en-US" dirty="0"/>
-              <a:t>18/02/05</a:t>
+              <a:t>18/02/07</a:t>
             </a:fld>
             <a:endParaRPr lang="en-US" dirty="0"/>
           </a:p>
@@ -1224,7 +1229,7 @@
             <a:fld id="{87DE6118-2437-4B30-8E3C-4D2BE6020583}" type="datetimeFigureOut">
               <a:rPr lang="en-US" dirty="0"/>
               <a:pPr/>
-              <a:t>18/02/05</a:t>
+              <a:t>18/02/07</a:t>
             </a:fld>
             <a:endParaRPr lang="en-US" dirty="0"/>
           </a:p>
@@ -1614,7 +1619,7 @@
           <a:p>
             <a:fld id="{87DE6118-2437-4B30-8E3C-4D2BE6020583}" type="datetimeFigureOut">
               <a:rPr lang="en-US" dirty="0"/>
-              <a:t>18/02/05</a:t>
+              <a:t>18/02/07</a:t>
             </a:fld>
             <a:endParaRPr lang="en-US" dirty="0"/>
           </a:p>
@@ -2086,7 +2091,7 @@
           <a:p>
             <a:fld id="{87DE6118-2437-4B30-8E3C-4D2BE6020583}" type="datetimeFigureOut">
               <a:rPr lang="en-US" dirty="0"/>
-              <a:t>18/02/05</a:t>
+              <a:t>18/02/07</a:t>
             </a:fld>
             <a:endParaRPr lang="en-US" dirty="0"/>
           </a:p>
@@ -2199,7 +2204,7 @@
           <a:p>
             <a:fld id="{87DE6118-2437-4B30-8E3C-4D2BE6020583}" type="datetimeFigureOut">
               <a:rPr lang="en-US" dirty="0"/>
-              <a:t>18/02/05</a:t>
+              <a:t>18/02/07</a:t>
             </a:fld>
             <a:endParaRPr lang="en-US" dirty="0"/>
           </a:p>
@@ -2289,7 +2294,7 @@
           <a:p>
             <a:fld id="{87DE6118-2437-4B30-8E3C-4D2BE6020583}" type="datetimeFigureOut">
               <a:rPr lang="en-US" dirty="0"/>
-              <a:t>18/02/05</a:t>
+              <a:t>18/02/07</a:t>
             </a:fld>
             <a:endParaRPr lang="en-US" dirty="0"/>
           </a:p>
@@ -2631,7 +2636,7 @@
             <a:fld id="{87DE6118-2437-4B30-8E3C-4D2BE6020583}" type="datetimeFigureOut">
               <a:rPr lang="en-US" dirty="0"/>
               <a:pPr/>
-              <a:t>18/02/05</a:t>
+              <a:t>18/02/07</a:t>
             </a:fld>
             <a:endParaRPr lang="en-US" dirty="0"/>
           </a:p>
@@ -3016,7 +3021,7 @@
             <a:fld id="{87DE6118-2437-4B30-8E3C-4D2BE6020583}" type="datetimeFigureOut">
               <a:rPr lang="en-US" dirty="0"/>
               <a:pPr/>
-              <a:t>18/02/05</a:t>
+              <a:t>18/02/07</a:t>
             </a:fld>
             <a:endParaRPr lang="en-US" dirty="0"/>
           </a:p>
@@ -3291,7 +3296,7 @@
             <a:fld id="{87DE6118-2437-4B30-8E3C-4D2BE6020583}" type="datetimeFigureOut">
               <a:rPr lang="en-US" dirty="0"/>
               <a:pPr/>
-              <a:t>18/02/05</a:t>
+              <a:t>18/02/07</a:t>
             </a:fld>
             <a:endParaRPr lang="en-US" dirty="0"/>
           </a:p>
@@ -4033,11 +4038,8 @@
           <a:p>
             <a:r>
               <a:rPr lang="en-US" dirty="0"/>
-              <a:t>In general, performance will be evaluated by using the Receiver Operating Characteristics ROC curve of the neural network’s after being exposed to varying quantities and types of training data and test data.  Key metrics to collect will be </a:t>
-            </a:r>
-          </a:p>
-          <a:p>
-            <a:endParaRPr lang="en-US" dirty="0"/>
+              <a:t>In general, performance will be evaluated by using the Receiver Operating Characteristics ROC curve of the neural network’s after being exposed to varying quantities and types of training data and test data.</a:t>
+            </a:r>
           </a:p>
         </p:txBody>
       </p:sp>
@@ -4232,7 +4234,7 @@
             <a:pPr lvl="0"/>
             <a:r>
               <a:rPr lang="en-US" dirty="0"/>
-              <a:t>Use LSTM Networks Model.  Long Short Term Memory networks – usually just called “LSTMs” – are a special kind of RNN, capable of learning long-term dependencies.</a:t>
+              <a:t>Use LSTM Networks Model.  Long Short Term Memory are a special kind of RNN, capable of learning long-term dependencies.</a:t>
             </a:r>
           </a:p>
           <a:p>
@@ -4346,6 +4348,36 @@
           </a:p>
         </p:txBody>
       </p:sp>
+      <p:pic>
+        <p:nvPicPr>
+          <p:cNvPr id="5" name="图片 4" descr="图片包含 剪贴画&#10;&#10;已生成高可信度的说明">
+            <a:extLst>
+              <a:ext uri="{FF2B5EF4-FFF2-40B4-BE49-F238E27FC236}">
+                <a16:creationId xmlns:a16="http://schemas.microsoft.com/office/drawing/2014/main" id="{B6CB19B8-D5A2-4F4C-BF0B-2BA2170210BF}"/>
+              </a:ext>
+            </a:extLst>
+          </p:cNvPr>
+          <p:cNvPicPr>
+            <a:picLocks noChangeAspect="1"/>
+          </p:cNvPicPr>
+          <p:nvPr/>
+        </p:nvPicPr>
+        <p:blipFill>
+          <a:blip r:embed="rId2"/>
+          <a:stretch>
+            <a:fillRect/>
+          </a:stretch>
+        </p:blipFill>
+        <p:spPr>
+          <a:xfrm>
+            <a:off x="4129087" y="4076700"/>
+            <a:ext cx="3749167" cy="2019300"/>
+          </a:xfrm>
+          <a:prstGeom prst="rect">
+            <a:avLst/>
+          </a:prstGeom>
+        </p:spPr>
+      </p:pic>
     </p:spTree>
     <p:extLst>
       <p:ext uri="{BB962C8B-B14F-4D97-AF65-F5344CB8AC3E}">

</xml_diff>